<commit_message>
Versão rodando corretamente e apresentação pronta
</commit_message>
<xml_diff>
--- a/tcc_documento/Apresentacao_TCC_Felipe_Estrada.pptx
+++ b/tcc_documento/Apresentacao_TCC_Felipe_Estrada.pptx
@@ -751,73 +751,31 @@
           <a:p>
             <a:r>
               <a:rPr lang="pt-BR" dirty="0"/>
-              <a:t>Para avaliar a viabilidade de redes neurais compactas na detecção de catarata, utilizamos um conjunto de dados especializado contendo imagens oftalmológicas classificadas em quatro categorias: </a:t>
+              <a:t>Apesar do grande sucesso dos Transformers no NLP, sua aplicação em </a:t>
             </a:r>
             <a:r>
               <a:rPr lang="pt-BR" b="1" dirty="0"/>
-              <a:t>normal, catarata, glaucoma e doenças de retina</a:t>
+              <a:t>Visão Computacional</a:t>
             </a:r>
             <a:r>
               <a:rPr lang="pt-BR" dirty="0"/>
-              <a:t>. No entanto, como o foco do estudo é a detecção de catarata, os experimentos foram conduzidos em duas abordagens distintas: uma de </a:t>
+              <a:t> só ocorreu recentemente, com a introdução do </a:t>
             </a:r>
             <a:r>
               <a:rPr lang="pt-BR" b="1" dirty="0"/>
-              <a:t>classificação binária</a:t>
-            </a:r>
-            <a:r>
-              <a:rPr lang="pt-BR" dirty="0"/>
-              <a:t>, diferenciando apenas entre olhos normais e olhos com catarata, e outra de </a:t>
+              <a:t>Vision </a:t>
+            </a:r>
+            <a:r>
+              <a:rPr lang="pt-BR" b="1" dirty="0" err="1"/>
+              <a:t>Transformer</a:t>
             </a:r>
             <a:r>
               <a:rPr lang="pt-BR" b="1" dirty="0"/>
-              <a:t>classificação </a:t>
+              <a:t> (</a:t>
             </a:r>
             <a:r>
               <a:rPr lang="pt-BR" b="1" dirty="0" err="1"/>
-              <a:t>multiclasse</a:t>
-            </a:r>
-            <a:r>
-              <a:rPr lang="pt-BR" dirty="0"/>
-              <a:t>, incluindo todas as categorias presentes no </a:t>
-            </a:r>
-            <a:r>
-              <a:rPr lang="pt-BR" dirty="0" err="1"/>
-              <a:t>dataset</a:t>
-            </a:r>
-            <a:r>
-              <a:rPr lang="pt-BR" dirty="0"/>
-              <a:t>.</a:t>
-            </a:r>
-          </a:p>
-          <a:p>
-            <a:r>
-              <a:rPr lang="pt-BR" dirty="0"/>
-              <a:t>Antes do treinamento dos modelos, foi realizada uma </a:t>
-            </a:r>
-            <a:r>
-              <a:rPr lang="pt-BR" b="1" dirty="0"/>
-              <a:t>etapa de pré-processamento das imagens</a:t>
-            </a:r>
-            <a:r>
-              <a:rPr lang="pt-BR" dirty="0"/>
-              <a:t> para garantir a consistência dos dados. Todas as imagens foram </a:t>
-            </a:r>
-            <a:r>
-              <a:rPr lang="pt-BR" b="1" dirty="0"/>
-              <a:t>redimensionadas</a:t>
-            </a:r>
-            <a:r>
-              <a:rPr lang="pt-BR" dirty="0"/>
-              <a:t> para um tamanho padrão compatível com os modelos utilizados, normalizadas para valores entre 0 e 1 e submetidas a técnicas de </a:t>
-            </a:r>
-            <a:r>
-              <a:rPr lang="pt-BR" b="1" dirty="0"/>
-              <a:t>aumento de dados (Data </a:t>
-            </a:r>
-            <a:r>
-              <a:rPr lang="pt-BR" b="1" dirty="0" err="1"/>
-              <a:t>Augmentation</a:t>
+              <a:t>ViT</a:t>
             </a:r>
             <a:r>
               <a:rPr lang="pt-BR" b="1" dirty="0"/>
@@ -825,77 +783,342 @@
             </a:r>
             <a:r>
               <a:rPr lang="pt-BR" dirty="0"/>
-              <a:t>, como rotações aleatórias, mudanças de brilho e espelhamento horizontal. Esse procedimento visa aumentar a variabilidade do conjunto de treinamento e reduzir o risco de </a:t>
+              <a:t>. Diferente das redes </a:t>
+            </a:r>
+            <a:r>
+              <a:rPr lang="pt-BR" dirty="0" err="1"/>
+              <a:t>convolucionais</a:t>
+            </a:r>
+            <a:r>
+              <a:rPr lang="pt-BR" dirty="0"/>
+              <a:t>, que utilizam filtros para extrair características locais da imagem, o </a:t>
+            </a:r>
+            <a:r>
+              <a:rPr lang="pt-BR" dirty="0" err="1"/>
+              <a:t>ViT</a:t>
+            </a:r>
+            <a:r>
+              <a:rPr lang="pt-BR" dirty="0"/>
+              <a:t> trata imagens de maneira semelhante ao processamento de texto, dividindo-as em </a:t>
+            </a:r>
+            <a:r>
+              <a:rPr lang="pt-BR" b="1" dirty="0"/>
+              <a:t>pequenos patches</a:t>
+            </a:r>
+            <a:r>
+              <a:rPr lang="pt-BR" dirty="0"/>
+              <a:t> e processando cada um como um </a:t>
+            </a:r>
+            <a:r>
+              <a:rPr lang="pt-BR" b="1" dirty="0"/>
+              <a:t>token</a:t>
+            </a:r>
+            <a:r>
+              <a:rPr lang="pt-BR" dirty="0"/>
+              <a:t> dentro do modelo de atenção.</a:t>
+            </a:r>
+          </a:p>
+          <a:p>
+            <a:r>
+              <a:rPr lang="pt-BR" dirty="0"/>
+              <a:t>O primeiro passo do </a:t>
+            </a:r>
+            <a:r>
+              <a:rPr lang="pt-BR" dirty="0" err="1"/>
+              <a:t>ViT</a:t>
+            </a:r>
+            <a:r>
+              <a:rPr lang="pt-BR" dirty="0"/>
+              <a:t> é a </a:t>
+            </a:r>
+            <a:r>
+              <a:rPr lang="pt-BR" b="1" dirty="0"/>
+              <a:t>divisão da imagem em patches de tamanho fixo</a:t>
+            </a:r>
+            <a:r>
+              <a:rPr lang="pt-BR" dirty="0"/>
+              <a:t>. Cada patch é transformado em um vetor por meio de uma camada chamada </a:t>
+            </a:r>
+            <a:r>
+              <a:rPr lang="pt-BR" b="1" dirty="0"/>
+              <a:t>Patch </a:t>
             </a:r>
             <a:r>
               <a:rPr lang="pt-BR" b="1" dirty="0" err="1"/>
-              <a:t>overfitting</a:t>
+              <a:t>Embedding</a:t>
             </a:r>
             <a:r>
               <a:rPr lang="pt-BR" dirty="0"/>
-              <a:t>.</a:t>
-            </a:r>
-          </a:p>
-          <a:p>
+              <a:t>, que projeta a informação espacial para um espaço vetorial adequado para o </a:t>
+            </a:r>
+            <a:r>
+              <a:rPr lang="pt-BR" dirty="0" err="1"/>
+              <a:t>Transformer</a:t>
+            </a:r>
             <a:r>
               <a:rPr lang="pt-BR" dirty="0"/>
-              <a:t>A base de dados foi então dividida em três partes:</a:t>
-            </a:r>
-          </a:p>
-          <a:p>
-            <a:pPr>
-              <a:buFont typeface="Arial" panose="020B0604020202020204" pitchFamily="34" charset="0"/>
-              <a:buChar char="•"/>
-            </a:pPr>
+              <a:t>. Para garantir que a ordem dos patches seja preservada, adiciona-se uma informação adicional chamada </a:t>
+            </a:r>
+            <a:r>
+              <a:rPr lang="pt-BR" b="1" dirty="0" err="1"/>
+              <a:t>Positional</a:t>
+            </a:r>
             <a:r>
               <a:rPr lang="pt-BR" b="1" dirty="0"/>
-              <a:t>80% para treinamento</a:t>
+              <a:t> </a:t>
+            </a:r>
+            <a:r>
+              <a:rPr lang="pt-BR" b="1" dirty="0" err="1"/>
+              <a:t>Encoding</a:t>
             </a:r>
             <a:r>
               <a:rPr lang="pt-BR" dirty="0"/>
-              <a:t>: conjunto de imagens usado para ajuste dos pesos dos modelos.</a:t>
-            </a:r>
-          </a:p>
-          <a:p>
-            <a:pPr>
-              <a:buFont typeface="Arial" panose="020B0604020202020204" pitchFamily="34" charset="0"/>
-              <a:buChar char="•"/>
-            </a:pPr>
+              <a:t>, que fornece um indicativo da posição original de cada patch na imagem.</a:t>
+            </a:r>
+          </a:p>
+          <a:p>
+            <a:r>
+              <a:rPr lang="pt-BR" dirty="0"/>
+              <a:t>Depois dessa etapa, os vetores são passados para várias camadas do </a:t>
+            </a:r>
+            <a:r>
+              <a:rPr lang="pt-BR" dirty="0" err="1"/>
+              <a:t>Transformer</a:t>
+            </a:r>
+            <a:r>
+              <a:rPr lang="pt-BR" dirty="0"/>
+              <a:t>, onde ocorre o processamento de </a:t>
+            </a:r>
+            <a:r>
+              <a:rPr lang="pt-BR" dirty="0" err="1"/>
+              <a:t>autoatenção</a:t>
+            </a:r>
+            <a:r>
+              <a:rPr lang="pt-BR" dirty="0"/>
+              <a:t>. A diferença fundamental entre o </a:t>
+            </a:r>
+            <a:r>
+              <a:rPr lang="pt-BR" dirty="0" err="1"/>
+              <a:t>ViT</a:t>
+            </a:r>
+            <a:r>
+              <a:rPr lang="pt-BR" dirty="0"/>
+              <a:t> e uma CNN é que, enquanto as redes </a:t>
+            </a:r>
+            <a:r>
+              <a:rPr lang="pt-BR" dirty="0" err="1"/>
+              <a:t>convolucionais</a:t>
+            </a:r>
+            <a:r>
+              <a:rPr lang="pt-BR" dirty="0"/>
+              <a:t> extraem características locais da imagem por meio de filtros especializados, o </a:t>
+            </a:r>
+            <a:r>
+              <a:rPr lang="pt-BR" dirty="0" err="1"/>
+              <a:t>ViT</a:t>
+            </a:r>
+            <a:r>
+              <a:rPr lang="pt-BR" dirty="0"/>
+              <a:t> processa a imagem de forma </a:t>
+            </a:r>
             <a:r>
               <a:rPr lang="pt-BR" b="1" dirty="0"/>
-              <a:t>12% para validação</a:t>
+              <a:t>global</a:t>
             </a:r>
             <a:r>
               <a:rPr lang="pt-BR" dirty="0"/>
-              <a:t>: utilizado para monitoramento do desempenho durante o treinamento e ajuste de </a:t>
+              <a:t>, permitindo que cada parte da imagem interaja diretamente com todas as outras partes. No final do modelo, um </a:t>
+            </a:r>
+            <a:r>
+              <a:rPr lang="pt-BR" b="1" dirty="0"/>
+              <a:t>Token de Classe</a:t>
+            </a:r>
+            <a:r>
+              <a:rPr lang="pt-BR" dirty="0"/>
+              <a:t> é adicionado e utilizado para representar a saída final da rede, equivalente à predição do modelo.</a:t>
+            </a:r>
+          </a:p>
+          <a:p>
+            <a:r>
+              <a:rPr lang="pt-BR" b="1" dirty="0"/>
+              <a:t>Desafios do Vision </a:t>
+            </a:r>
+            <a:r>
+              <a:rPr lang="pt-BR" b="1" dirty="0" err="1"/>
+              <a:t>Transformer</a:t>
+            </a:r>
+            <a:endParaRPr lang="pt-BR" b="1" dirty="0"/>
+          </a:p>
+          <a:p>
+            <a:r>
+              <a:rPr lang="pt-BR" dirty="0"/>
+              <a:t>Embora o </a:t>
             </a:r>
             <a:r>
               <a:rPr lang="pt-BR" dirty="0" err="1"/>
-              <a:t>hiperparâmetros</a:t>
+              <a:t>ViT</a:t>
             </a:r>
             <a:r>
               <a:rPr lang="pt-BR" dirty="0"/>
-              <a:t>.</a:t>
-            </a:r>
-          </a:p>
-          <a:p>
-            <a:pPr>
-              <a:buFont typeface="Arial" panose="020B0604020202020204" pitchFamily="34" charset="0"/>
-              <a:buChar char="•"/>
-            </a:pPr>
+              <a:t> tenha demonstrado resultados impressionantes em grandes bases de dados, como </a:t>
+            </a:r>
             <a:r>
               <a:rPr lang="pt-BR" b="1" dirty="0"/>
-              <a:t>8% para teste</a:t>
+              <a:t>ImageNet-21k</a:t>
             </a:r>
             <a:r>
               <a:rPr lang="pt-BR" dirty="0"/>
-              <a:t>: conjunto reservado para a avaliação final dos modelos.</a:t>
-            </a:r>
-          </a:p>
-          <a:p>
+              <a:t>, ele apresenta alguns desafios significativos. O principal deles é a necessidade de </a:t>
+            </a:r>
+            <a:r>
+              <a:rPr lang="pt-BR" b="1" dirty="0"/>
+              <a:t>grandes quantidades de dados para generalizar bem</a:t>
+            </a:r>
             <a:r>
               <a:rPr lang="pt-BR" dirty="0"/>
-              <a:t>Dado que a disponibilidade de imagens médicas rotuladas é frequentemente limitada, este trabalho busca avaliar como redes neurais compactas se comportam nesse cenário, verificando se sua eficiência pode ser mantida mesmo com um volume reduzido de dados.</a:t>
+              <a:t>, pois, ao contrário das </a:t>
+            </a:r>
+            <a:r>
+              <a:rPr lang="pt-BR" dirty="0" err="1"/>
+              <a:t>CNNs</a:t>
+            </a:r>
+            <a:r>
+              <a:rPr lang="pt-BR" dirty="0"/>
+              <a:t>, o </a:t>
+            </a:r>
+            <a:r>
+              <a:rPr lang="pt-BR" dirty="0" err="1"/>
+              <a:t>ViT</a:t>
+            </a:r>
+            <a:r>
+              <a:rPr lang="pt-BR" dirty="0"/>
+              <a:t> não possui filtros </a:t>
+            </a:r>
+            <a:r>
+              <a:rPr lang="pt-BR" dirty="0" err="1"/>
+              <a:t>convolucionais</a:t>
+            </a:r>
+            <a:r>
+              <a:rPr lang="pt-BR" dirty="0"/>
+              <a:t> para aprender representações visuais eficientes em pequenos conjuntos de dados. Isso faz com que o </a:t>
+            </a:r>
+            <a:r>
+              <a:rPr lang="pt-BR" dirty="0" err="1"/>
+              <a:t>ViT</a:t>
+            </a:r>
+            <a:r>
+              <a:rPr lang="pt-BR" dirty="0"/>
+              <a:t> tenha </a:t>
+            </a:r>
+            <a:r>
+              <a:rPr lang="pt-BR" b="1" dirty="0"/>
+              <a:t>desempenho inferior em bases pequenas</a:t>
+            </a:r>
+            <a:r>
+              <a:rPr lang="pt-BR" dirty="0"/>
+              <a:t>, tornando-se uma escolha menos viável para aplicações médicas onde a disponibilidade de imagens rotuladas pode ser limitada.</a:t>
+            </a:r>
+          </a:p>
+          <a:p>
+            <a:r>
+              <a:rPr lang="pt-BR" dirty="0"/>
+              <a:t>Para contornar essa limitação, foram desenvolvidas abordagens híbridas que combinam </a:t>
+            </a:r>
+            <a:r>
+              <a:rPr lang="pt-BR" b="1" dirty="0" err="1"/>
+              <a:t>CNNs</a:t>
+            </a:r>
+            <a:r>
+              <a:rPr lang="pt-BR" b="1" dirty="0"/>
+              <a:t> e Transformers</a:t>
+            </a:r>
+            <a:r>
+              <a:rPr lang="pt-BR" dirty="0"/>
+              <a:t>. Um exemplo dessa estratégia é o </a:t>
+            </a:r>
+            <a:r>
+              <a:rPr lang="pt-BR" b="1" dirty="0" err="1"/>
+              <a:t>ResNet-ViT</a:t>
+            </a:r>
+            <a:r>
+              <a:rPr lang="pt-BR" dirty="0"/>
+              <a:t>, onde uma </a:t>
+            </a:r>
+            <a:r>
+              <a:rPr lang="pt-BR" dirty="0" err="1"/>
+              <a:t>ResNet</a:t>
+            </a:r>
+            <a:r>
+              <a:rPr lang="pt-BR" dirty="0"/>
+              <a:t> é utilizada para extrair características da imagem antes de alimentar o </a:t>
+            </a:r>
+            <a:r>
+              <a:rPr lang="pt-BR" dirty="0" err="1"/>
+              <a:t>Transformer</a:t>
+            </a:r>
+            <a:r>
+              <a:rPr lang="pt-BR" dirty="0"/>
+              <a:t>, substituindo o tradicional Patch </a:t>
+            </a:r>
+            <a:r>
+              <a:rPr lang="pt-BR" dirty="0" err="1"/>
+              <a:t>Embedding</a:t>
+            </a:r>
+            <a:r>
+              <a:rPr lang="pt-BR" dirty="0"/>
+              <a:t>. Outra alternativa é o </a:t>
+            </a:r>
+            <a:r>
+              <a:rPr lang="pt-BR" b="1" dirty="0" err="1"/>
+              <a:t>Compact</a:t>
+            </a:r>
+            <a:r>
+              <a:rPr lang="pt-BR" b="1" dirty="0"/>
+              <a:t> </a:t>
+            </a:r>
+            <a:r>
+              <a:rPr lang="pt-BR" b="1" dirty="0" err="1"/>
+              <a:t>Convolutional</a:t>
+            </a:r>
+            <a:r>
+              <a:rPr lang="pt-BR" b="1" dirty="0"/>
+              <a:t> </a:t>
+            </a:r>
+            <a:r>
+              <a:rPr lang="pt-BR" b="1" dirty="0" err="1"/>
+              <a:t>Transformer</a:t>
+            </a:r>
+            <a:r>
+              <a:rPr lang="pt-BR" b="1" dirty="0"/>
+              <a:t> (CCT)</a:t>
+            </a:r>
+            <a:r>
+              <a:rPr lang="pt-BR" dirty="0"/>
+              <a:t>, que incorpora uma camada </a:t>
+            </a:r>
+            <a:r>
+              <a:rPr lang="pt-BR" dirty="0" err="1"/>
+              <a:t>convolucional</a:t>
+            </a:r>
+            <a:r>
+              <a:rPr lang="pt-BR" dirty="0"/>
+              <a:t> na entrada do </a:t>
+            </a:r>
+            <a:r>
+              <a:rPr lang="pt-BR" dirty="0" err="1"/>
+              <a:t>ViT</a:t>
+            </a:r>
+            <a:r>
+              <a:rPr lang="pt-BR" dirty="0"/>
+              <a:t>, garantindo que a rede aprenda características locais antes de aplicar a </a:t>
+            </a:r>
+            <a:r>
+              <a:rPr lang="pt-BR" dirty="0" err="1"/>
+              <a:t>autoatenção</a:t>
+            </a:r>
+            <a:r>
+              <a:rPr lang="pt-BR" dirty="0"/>
+              <a:t> global.</a:t>
             </a:r>
           </a:p>
           <a:p>
@@ -921,7 +1144,7 @@
             <a:fld id="{5278106F-20E4-4638-BAF2-3768F6927375}" type="slidenum">
               <a:rPr lang="pt-BR" smtClean="0"/>
               <a:pPr/>
-              <a:t>12</a:t>
+              <a:t>11</a:t>
             </a:fld>
             <a:endParaRPr lang="pt-BR"/>
           </a:p>
@@ -930,7 +1153,7 @@
     </p:spTree>
     <p:extLst>
       <p:ext uri="{BB962C8B-B14F-4D97-AF65-F5344CB8AC3E}">
-        <p14:creationId xmlns:p14="http://schemas.microsoft.com/office/powerpoint/2010/main" val="2603724197"/>
+        <p14:creationId xmlns:p14="http://schemas.microsoft.com/office/powerpoint/2010/main" val="1592683391"/>
       </p:ext>
     </p:extLst>
   </p:cSld>
@@ -986,152 +1209,155 @@
           <a:p>
             <a:r>
               <a:rPr lang="pt-BR" dirty="0"/>
-              <a:t>Foram implementadas e comparadas diversas arquiteturas de redes neurais, divididas em três grupos principais: </a:t>
+              <a:t>Para avaliar a viabilidade de redes neurais compactas na detecção de catarata, utilizamos um conjunto de dados especializado contendo imagens oftalmológicas classificadas em quatro categorias: </a:t>
             </a:r>
             <a:r>
               <a:rPr lang="pt-BR" b="1" dirty="0"/>
-              <a:t>Redes Neurais </a:t>
+              <a:t>normal, catarata, glaucoma e doenças de retina</a:t>
+            </a:r>
+            <a:r>
+              <a:rPr lang="pt-BR" dirty="0"/>
+              <a:t>. No entanto, como o foco do estudo é a detecção de catarata, os experimentos foram conduzidos em duas abordagens distintas: uma de </a:t>
+            </a:r>
+            <a:r>
+              <a:rPr lang="pt-BR" b="1" dirty="0"/>
+              <a:t>classificação binária</a:t>
+            </a:r>
+            <a:r>
+              <a:rPr lang="pt-BR" dirty="0"/>
+              <a:t>, diferenciando apenas entre olhos normais e olhos com catarata, e outra de </a:t>
+            </a:r>
+            <a:r>
+              <a:rPr lang="pt-BR" b="1" dirty="0"/>
+              <a:t>classificação </a:t>
             </a:r>
             <a:r>
               <a:rPr lang="pt-BR" b="1" dirty="0" err="1"/>
-              <a:t>Convolucionais</a:t>
+              <a:t>multiclasse</a:t>
+            </a:r>
+            <a:r>
+              <a:rPr lang="pt-BR" dirty="0"/>
+              <a:t>, incluindo todas as categorias presentes no </a:t>
+            </a:r>
+            <a:r>
+              <a:rPr lang="pt-BR" dirty="0" err="1"/>
+              <a:t>dataset</a:t>
+            </a:r>
+            <a:r>
+              <a:rPr lang="pt-BR" dirty="0"/>
+              <a:t>.</a:t>
+            </a:r>
+          </a:p>
+          <a:p>
+            <a:r>
+              <a:rPr lang="pt-BR" dirty="0"/>
+              <a:t>Antes do treinamento dos modelos, foi realizada uma </a:t>
             </a:r>
             <a:r>
               <a:rPr lang="pt-BR" b="1" dirty="0"/>
-              <a:t> (</a:t>
+              <a:t>etapa de pré-processamento das imagens</a:t>
+            </a:r>
+            <a:r>
+              <a:rPr lang="pt-BR" dirty="0"/>
+              <a:t> para garantir a consistência dos dados. Todas as imagens foram </a:t>
+            </a:r>
+            <a:r>
+              <a:rPr lang="pt-BR" b="1" dirty="0"/>
+              <a:t>redimensionadas</a:t>
+            </a:r>
+            <a:r>
+              <a:rPr lang="pt-BR" dirty="0"/>
+              <a:t> para um tamanho padrão compatível com os modelos utilizados, normalizadas para valores entre 0 e 1 e submetidas a técnicas de </a:t>
+            </a:r>
+            <a:r>
+              <a:rPr lang="pt-BR" b="1" dirty="0"/>
+              <a:t>aumento de dados (Data </a:t>
             </a:r>
             <a:r>
               <a:rPr lang="pt-BR" b="1" dirty="0" err="1"/>
-              <a:t>CNNs</a:t>
+              <a:t>Augmentation</a:t>
             </a:r>
             <a:r>
               <a:rPr lang="pt-BR" b="1" dirty="0"/>
-              <a:t>), Vision Transformers (</a:t>
+              <a:t>)</a:t>
+            </a:r>
+            <a:r>
+              <a:rPr lang="pt-BR" dirty="0"/>
+              <a:t>, como rotações aleatórias, mudanças de brilho e espelhamento horizontal. Esse procedimento visa aumentar a variabilidade do conjunto de treinamento e reduzir o risco de </a:t>
             </a:r>
             <a:r>
               <a:rPr lang="pt-BR" b="1" dirty="0" err="1"/>
-              <a:t>ViTs</a:t>
-            </a:r>
+              <a:t>overfitting</a:t>
+            </a:r>
+            <a:r>
+              <a:rPr lang="pt-BR" dirty="0"/>
+              <a:t>.</a:t>
+            </a:r>
+          </a:p>
+          <a:p>
+            <a:r>
+              <a:rPr lang="pt-BR" dirty="0"/>
+              <a:t>A base de dados foi então dividida em três partes:</a:t>
+            </a:r>
+          </a:p>
+          <a:p>
+            <a:pPr>
+              <a:buFont typeface="Arial" panose="020B0604020202020204" pitchFamily="34" charset="0"/>
+              <a:buChar char="•"/>
+            </a:pPr>
             <a:r>
               <a:rPr lang="pt-BR" b="1" dirty="0"/>
-              <a:t>) e modelos híbridos</a:t>
+              <a:t>80% para treinamento</a:t>
             </a:r>
             <a:r>
               <a:rPr lang="pt-BR" dirty="0"/>
-              <a:t> que combinam as duas abordagens.</a:t>
-            </a:r>
-          </a:p>
-          <a:p>
+              <a:t>: conjunto de imagens usado para ajuste dos pesos dos modelos.</a:t>
+            </a:r>
+          </a:p>
+          <a:p>
+            <a:pPr>
+              <a:buFont typeface="Arial" panose="020B0604020202020204" pitchFamily="34" charset="0"/>
+              <a:buChar char="•"/>
+            </a:pPr>
+            <a:r>
+              <a:rPr lang="pt-BR" b="1" dirty="0"/>
+              <a:t>12% para validação</a:t>
+            </a:r>
             <a:r>
               <a:rPr lang="pt-BR" dirty="0"/>
-              <a:t>No grupo das </a:t>
+              <a:t>: utilizado para monitoramento do desempenho durante o treinamento e ajuste de </a:t>
             </a:r>
             <a:r>
               <a:rPr lang="pt-BR" dirty="0" err="1"/>
-              <a:t>CNNs</a:t>
+              <a:t>hiperparâmetros</a:t>
             </a:r>
             <a:r>
               <a:rPr lang="pt-BR" dirty="0"/>
-              <a:t>, foi testado o modelo EfficientNet-B0, uma versão compacta da família </a:t>
-            </a:r>
-            <a:r>
-              <a:rPr lang="pt-BR" dirty="0" err="1"/>
-              <a:t>EfficientNet</a:t>
+              <a:t>.</a:t>
+            </a:r>
+          </a:p>
+          <a:p>
+            <a:pPr>
+              <a:buFont typeface="Arial" panose="020B0604020202020204" pitchFamily="34" charset="0"/>
+              <a:buChar char="•"/>
+            </a:pPr>
+            <a:r>
+              <a:rPr lang="pt-BR" b="1" dirty="0"/>
+              <a:t>8% para teste</a:t>
             </a:r>
             <a:r>
               <a:rPr lang="pt-BR" dirty="0"/>
-              <a:t> e também modelos da </a:t>
-            </a:r>
-            <a:r>
-              <a:rPr lang="pt-BR" b="1" dirty="0"/>
-              <a:t>família </a:t>
-            </a:r>
-            <a:r>
-              <a:rPr lang="pt-BR" b="1" dirty="0" err="1"/>
-              <a:t>ResNet</a:t>
-            </a:r>
+              <a:t>: conjunto reservado para a avaliação final dos modelos.</a:t>
+            </a:r>
+          </a:p>
+          <a:p>
             <a:r>
               <a:rPr lang="pt-BR" dirty="0"/>
-              <a:t>, como </a:t>
-            </a:r>
-            <a:r>
-              <a:rPr lang="pt-BR" b="1" dirty="0"/>
-              <a:t>ResNet6, ResNet8, ResNet10 e ResNet18</a:t>
-            </a:r>
-            <a:r>
-              <a:rPr lang="pt-BR" dirty="0"/>
-              <a:t> foram escolhidas para avaliar como diferentes profundidades influenciam o desempenho da detecção de catarata.</a:t>
-            </a:r>
-          </a:p>
-          <a:p>
-            <a:r>
-              <a:rPr lang="pt-BR" dirty="0"/>
-              <a:t>Na abordagem baseada em </a:t>
-            </a:r>
-            <a:r>
-              <a:rPr lang="pt-BR" b="1" dirty="0"/>
-              <a:t>Transformers</a:t>
-            </a:r>
-            <a:r>
-              <a:rPr lang="pt-BR" dirty="0"/>
-              <a:t>, utilizamos o </a:t>
-            </a:r>
-            <a:r>
-              <a:rPr lang="pt-BR" b="1" dirty="0"/>
-              <a:t>Vision </a:t>
-            </a:r>
-            <a:r>
-              <a:rPr lang="pt-BR" b="1" dirty="0" err="1"/>
-              <a:t>Transformer</a:t>
-            </a:r>
-            <a:r>
-              <a:rPr lang="pt-BR" b="1" dirty="0"/>
-              <a:t> Lite (</a:t>
-            </a:r>
-            <a:r>
-              <a:rPr lang="pt-BR" b="1" dirty="0" err="1"/>
-              <a:t>ViT</a:t>
-            </a:r>
-            <a:r>
-              <a:rPr lang="pt-BR" b="1" dirty="0"/>
-              <a:t>-Lite)</a:t>
-            </a:r>
-            <a:r>
-              <a:rPr lang="pt-BR" dirty="0"/>
-              <a:t>, uma versão compacta do </a:t>
-            </a:r>
-            <a:r>
-              <a:rPr lang="pt-BR" dirty="0" err="1"/>
-              <a:t>ViT</a:t>
-            </a:r>
-            <a:r>
-              <a:rPr lang="pt-BR" dirty="0"/>
-              <a:t> original, adaptada para cenários com menor disponibilidade de processamento. Ele reduz o número de </a:t>
-            </a:r>
-            <a:r>
-              <a:rPr lang="pt-BR" b="1" dirty="0"/>
-              <a:t>camadas no </a:t>
-            </a:r>
-            <a:r>
-              <a:rPr lang="pt-BR" b="1" dirty="0" err="1"/>
-              <a:t>encoder</a:t>
-            </a:r>
-            <a:r>
-              <a:rPr lang="pt-BR" b="1" dirty="0"/>
-              <a:t> (de 12 para 4)</a:t>
-            </a:r>
-            <a:r>
-              <a:rPr lang="pt-BR" dirty="0"/>
-              <a:t> e o número de </a:t>
-            </a:r>
-            <a:r>
-              <a:rPr lang="pt-BR" b="1" dirty="0"/>
-              <a:t>cabeças de atenção (de 12 para 2)</a:t>
-            </a:r>
-            <a:r>
-              <a:rPr lang="pt-BR" dirty="0"/>
-              <a:t>, buscando minimizar a complexidade computacional sem comprometer significativamente o desempenho.</a:t>
-            </a:r>
+              <a:t>Dado que a disponibilidade de imagens médicas rotuladas é frequentemente limitada, este trabalho busca avaliar como redes neurais compactas se comportam nesse cenário, verificando se sua eficiência pode ser mantida mesmo com um volume reduzido de dados.</a:t>
+            </a:r>
+          </a:p>
+          <a:p>
+            <a:endParaRPr lang="pt-BR" dirty="0"/>
           </a:p>
         </p:txBody>
       </p:sp>
@@ -1153,7 +1379,7 @@
             <a:fld id="{5278106F-20E4-4638-BAF2-3768F6927375}" type="slidenum">
               <a:rPr lang="pt-BR" smtClean="0"/>
               <a:pPr/>
-              <a:t>13</a:t>
+              <a:t>12</a:t>
             </a:fld>
             <a:endParaRPr lang="pt-BR"/>
           </a:p>
@@ -1162,7 +1388,7 @@
     </p:spTree>
     <p:extLst>
       <p:ext uri="{BB962C8B-B14F-4D97-AF65-F5344CB8AC3E}">
-        <p14:creationId xmlns:p14="http://schemas.microsoft.com/office/powerpoint/2010/main" val="735503046"/>
+        <p14:creationId xmlns:p14="http://schemas.microsoft.com/office/powerpoint/2010/main" val="2603724197"/>
       </p:ext>
     </p:extLst>
   </p:cSld>
@@ -1216,42 +1442,101 @@
           <a:bodyPr/>
           <a:lstStyle/>
           <a:p>
-            <a:pPr marL="0" marR="0" lvl="0" indent="0" algn="l" defTabSz="914400" rtl="0" eaLnBrk="1" fontAlgn="auto" latinLnBrk="0" hangingPunct="1">
-              <a:lnSpc>
-                <a:spcPct val="100000"/>
-              </a:lnSpc>
-              <a:spcBef>
-                <a:spcPts val="0"/>
-              </a:spcBef>
-              <a:spcAft>
-                <a:spcPts val="0"/>
-              </a:spcAft>
-              <a:buClrTx/>
-              <a:buSzTx/>
-              <a:buFontTx/>
-              <a:buNone/>
-              <a:tabLst/>
-              <a:defRPr/>
-            </a:pPr>
             <a:r>
               <a:rPr lang="pt-BR" dirty="0"/>
-              <a:t>Por fim, os modelos híbridos testados incluem o </a:t>
+              <a:t>Foram implementadas e comparadas diversas arquiteturas de redes neurais, divididas em três grupos principais: </a:t>
+            </a:r>
+            <a:r>
+              <a:rPr lang="pt-BR" b="1" dirty="0"/>
+              <a:t>Redes Neurais </a:t>
             </a:r>
             <a:r>
               <a:rPr lang="pt-BR" b="1" dirty="0" err="1"/>
-              <a:t>Compact</a:t>
+              <a:t>Convolucionais</a:t>
             </a:r>
             <a:r>
               <a:rPr lang="pt-BR" b="1" dirty="0"/>
-              <a:t> </a:t>
+              <a:t> (</a:t>
             </a:r>
             <a:r>
               <a:rPr lang="pt-BR" b="1" dirty="0" err="1"/>
-              <a:t>Convolutional</a:t>
+              <a:t>CNNs</a:t>
             </a:r>
             <a:r>
               <a:rPr lang="pt-BR" b="1" dirty="0"/>
-              <a:t> </a:t>
+              <a:t>), Vision Transformers (</a:t>
+            </a:r>
+            <a:r>
+              <a:rPr lang="pt-BR" b="1" dirty="0" err="1"/>
+              <a:t>ViTs</a:t>
+            </a:r>
+            <a:r>
+              <a:rPr lang="pt-BR" b="1" dirty="0"/>
+              <a:t>) e modelos híbridos</a:t>
+            </a:r>
+            <a:r>
+              <a:rPr lang="pt-BR" dirty="0"/>
+              <a:t> que combinam as duas abordagens.</a:t>
+            </a:r>
+          </a:p>
+          <a:p>
+            <a:r>
+              <a:rPr lang="pt-BR" dirty="0"/>
+              <a:t>No grupo das </a:t>
+            </a:r>
+            <a:r>
+              <a:rPr lang="pt-BR" dirty="0" err="1"/>
+              <a:t>CNNs</a:t>
+            </a:r>
+            <a:r>
+              <a:rPr lang="pt-BR" dirty="0"/>
+              <a:t>, foi testado o modelo EfficientNet-B0, uma versão compacta da família </a:t>
+            </a:r>
+            <a:r>
+              <a:rPr lang="pt-BR" dirty="0" err="1"/>
+              <a:t>EfficientNet</a:t>
+            </a:r>
+            <a:r>
+              <a:rPr lang="pt-BR" dirty="0"/>
+              <a:t> e também modelos da </a:t>
+            </a:r>
+            <a:r>
+              <a:rPr lang="pt-BR" b="1" dirty="0"/>
+              <a:t>família </a:t>
+            </a:r>
+            <a:r>
+              <a:rPr lang="pt-BR" b="1" dirty="0" err="1"/>
+              <a:t>ResNet</a:t>
+            </a:r>
+            <a:r>
+              <a:rPr lang="pt-BR" dirty="0"/>
+              <a:t>, como </a:t>
+            </a:r>
+            <a:r>
+              <a:rPr lang="pt-BR" b="1" dirty="0"/>
+              <a:t>ResNet6, ResNet8, ResNet10 e ResNet18</a:t>
+            </a:r>
+            <a:r>
+              <a:rPr lang="pt-BR" dirty="0"/>
+              <a:t> foram escolhidas para avaliar como diferentes profundidades influenciam o desempenho da detecção de catarata.</a:t>
+            </a:r>
+          </a:p>
+          <a:p>
+            <a:r>
+              <a:rPr lang="pt-BR" dirty="0"/>
+              <a:t>Na abordagem baseada em </a:t>
+            </a:r>
+            <a:r>
+              <a:rPr lang="pt-BR" b="1" dirty="0"/>
+              <a:t>Transformers</a:t>
+            </a:r>
+            <a:r>
+              <a:rPr lang="pt-BR" dirty="0"/>
+              <a:t>, utilizamos o </a:t>
+            </a:r>
+            <a:r>
+              <a:rPr lang="pt-BR" b="1" dirty="0"/>
+              <a:t>Vision </a:t>
             </a:r>
             <a:r>
               <a:rPr lang="pt-BR" b="1" dirty="0" err="1"/>
@@ -1259,27 +1544,19 @@
             </a:r>
             <a:r>
               <a:rPr lang="pt-BR" b="1" dirty="0"/>
-              <a:t> (CCT)</a:t>
+              <a:t> Lite (</a:t>
+            </a:r>
+            <a:r>
+              <a:rPr lang="pt-BR" b="1" dirty="0" err="1"/>
+              <a:t>ViT</a:t>
+            </a:r>
+            <a:r>
+              <a:rPr lang="pt-BR" b="1" dirty="0"/>
+              <a:t>-Lite)</a:t>
             </a:r>
             <a:r>
               <a:rPr lang="pt-BR" dirty="0"/>
-              <a:t> e o </a:t>
-            </a:r>
-            <a:r>
-              <a:rPr lang="pt-BR" b="1" dirty="0" err="1"/>
-              <a:t>ResNet-ViT</a:t>
-            </a:r>
-            <a:r>
-              <a:rPr lang="pt-BR" dirty="0"/>
-              <a:t>, que combinam a eficiência das convoluções na extração de características locais com o poder dos Transformers na modelagem de relações globais na imagem. Enquanto o </a:t>
-            </a:r>
-            <a:r>
-              <a:rPr lang="pt-BR" b="1" dirty="0"/>
-              <a:t>CCT</a:t>
-            </a:r>
-            <a:r>
-              <a:rPr lang="pt-BR" dirty="0"/>
-              <a:t> incorpora convoluções na fase inicial do </a:t>
+              <a:t>, uma versão compacta do </a:t>
             </a:r>
             <a:r>
               <a:rPr lang="pt-BR" dirty="0" err="1"/>
@@ -1287,51 +1564,32 @@
             </a:r>
             <a:r>
               <a:rPr lang="pt-BR" dirty="0"/>
-              <a:t> para otimizar a extração de características, o </a:t>
+              <a:t> original, adaptada para cenários com menor disponibilidade de processamento. Ele reduz o número de </a:t>
+            </a:r>
+            <a:r>
+              <a:rPr lang="pt-BR" b="1" dirty="0"/>
+              <a:t>camadas no </a:t>
             </a:r>
             <a:r>
               <a:rPr lang="pt-BR" b="1" dirty="0" err="1"/>
-              <a:t>ResNet-ViT</a:t>
+              <a:t>encoder</a:t>
+            </a:r>
+            <a:r>
+              <a:rPr lang="pt-BR" b="1" dirty="0"/>
+              <a:t> (de 12 para 4)</a:t>
             </a:r>
             <a:r>
               <a:rPr lang="pt-BR" dirty="0"/>
-              <a:t> substitui o tradicional Patch </a:t>
-            </a:r>
-            <a:r>
-              <a:rPr lang="pt-BR" dirty="0" err="1"/>
-              <a:t>Embedding</a:t>
+              <a:t> e o número de </a:t>
+            </a:r>
+            <a:r>
+              <a:rPr lang="pt-BR" b="1" dirty="0"/>
+              <a:t>cabeças de atenção (de 12 para 2)</a:t>
             </a:r>
             <a:r>
               <a:rPr lang="pt-BR" dirty="0"/>
-              <a:t> do </a:t>
-            </a:r>
-            <a:r>
-              <a:rPr lang="pt-BR" dirty="0" err="1"/>
-              <a:t>ViT</a:t>
-            </a:r>
-            <a:r>
-              <a:rPr lang="pt-BR" dirty="0"/>
-              <a:t> por uma </a:t>
-            </a:r>
-            <a:r>
-              <a:rPr lang="pt-BR" b="1" dirty="0" err="1"/>
-              <a:t>ResNet</a:t>
-            </a:r>
-            <a:r>
-              <a:rPr lang="pt-BR" dirty="0"/>
-              <a:t>, permitindo que a extração de características seja feita por uma CNN antes da aplicação do mecanismo de </a:t>
-            </a:r>
-            <a:r>
-              <a:rPr lang="pt-BR" dirty="0" err="1"/>
-              <a:t>autoatenção</a:t>
-            </a:r>
-            <a:r>
-              <a:rPr lang="pt-BR" dirty="0"/>
-              <a:t>.</a:t>
-            </a:r>
-          </a:p>
-          <a:p>
-            <a:endParaRPr lang="pt-BR" dirty="0"/>
+              <a:t>, buscando minimizar a complexidade computacional sem comprometer significativamente o desempenho.</a:t>
+            </a:r>
           </a:p>
         </p:txBody>
       </p:sp>
@@ -1353,7 +1611,7 @@
             <a:fld id="{5278106F-20E4-4638-BAF2-3768F6927375}" type="slidenum">
               <a:rPr lang="pt-BR" smtClean="0"/>
               <a:pPr/>
-              <a:t>14</a:t>
+              <a:t>13</a:t>
             </a:fld>
             <a:endParaRPr lang="pt-BR"/>
           </a:p>
@@ -1362,7 +1620,7 @@
     </p:spTree>
     <p:extLst>
       <p:ext uri="{BB962C8B-B14F-4D97-AF65-F5344CB8AC3E}">
-        <p14:creationId xmlns:p14="http://schemas.microsoft.com/office/powerpoint/2010/main" val="3963180503"/>
+        <p14:creationId xmlns:p14="http://schemas.microsoft.com/office/powerpoint/2010/main" val="735503046"/>
       </p:ext>
     </p:extLst>
   </p:cSld>
@@ -1416,87 +1674,114 @@
           <a:bodyPr/>
           <a:lstStyle/>
           <a:p>
+            <a:pPr marL="0" marR="0" lvl="0" indent="0" algn="l" defTabSz="914400" rtl="0" eaLnBrk="1" fontAlgn="auto" latinLnBrk="0" hangingPunct="1">
+              <a:lnSpc>
+                <a:spcPct val="100000"/>
+              </a:lnSpc>
+              <a:spcBef>
+                <a:spcPts val="0"/>
+              </a:spcBef>
+              <a:spcAft>
+                <a:spcPts val="0"/>
+              </a:spcAft>
+              <a:buClrTx/>
+              <a:buSzTx/>
+              <a:buFontTx/>
+              <a:buNone/>
+              <a:tabLst/>
+              <a:defRPr/>
+            </a:pPr>
             <a:r>
               <a:rPr lang="pt-BR" dirty="0"/>
-              <a:t>O treinamento dos modelos foi realizado utilizando a </a:t>
+              <a:t>Por fim, os modelos híbridos testados incluem o </a:t>
+            </a:r>
+            <a:r>
+              <a:rPr lang="pt-BR" b="1" dirty="0" err="1"/>
+              <a:t>Compact</a:t>
             </a:r>
             <a:r>
               <a:rPr lang="pt-BR" b="1" dirty="0"/>
-              <a:t>biblioteca </a:t>
+              <a:t> </a:t>
             </a:r>
             <a:r>
               <a:rPr lang="pt-BR" b="1" dirty="0" err="1"/>
-              <a:t>PyTorch</a:t>
+              <a:t>Convolutional</a:t>
+            </a:r>
+            <a:r>
+              <a:rPr lang="pt-BR" b="1" dirty="0"/>
+              <a:t> </a:t>
+            </a:r>
+            <a:r>
+              <a:rPr lang="pt-BR" b="1" dirty="0" err="1"/>
+              <a:t>Transformer</a:t>
+            </a:r>
+            <a:r>
+              <a:rPr lang="pt-BR" b="1" dirty="0"/>
+              <a:t> (CCT)</a:t>
             </a:r>
             <a:r>
               <a:rPr lang="pt-BR" dirty="0"/>
-              <a:t>, com uma abordagem otimizada para cenários de dados limitados. Para garantir um aprendizado eficiente, utilizamos o </a:t>
+              <a:t> e o </a:t>
+            </a:r>
+            <a:r>
+              <a:rPr lang="pt-BR" b="1" dirty="0" err="1"/>
+              <a:t>ResNet-ViT</a:t>
+            </a:r>
+            <a:r>
+              <a:rPr lang="pt-BR" dirty="0"/>
+              <a:t>, que combinam a eficiência das convoluções na extração de características locais com o poder dos Transformers na modelagem de relações globais na imagem. Enquanto o </a:t>
             </a:r>
             <a:r>
               <a:rPr lang="pt-BR" b="1" dirty="0"/>
-              <a:t>otimizador </a:t>
+              <a:t>CCT</a:t>
+            </a:r>
+            <a:r>
+              <a:rPr lang="pt-BR" dirty="0"/>
+              <a:t> incorpora convoluções na fase inicial do </a:t>
+            </a:r>
+            <a:r>
+              <a:rPr lang="pt-BR" dirty="0" err="1"/>
+              <a:t>ViT</a:t>
+            </a:r>
+            <a:r>
+              <a:rPr lang="pt-BR" dirty="0"/>
+              <a:t> para otimizar a extração de características, o </a:t>
             </a:r>
             <a:r>
               <a:rPr lang="pt-BR" b="1" dirty="0" err="1"/>
-              <a:t>AdamW</a:t>
+              <a:t>ResNet-ViT</a:t>
             </a:r>
             <a:r>
               <a:rPr lang="pt-BR" dirty="0"/>
-              <a:t>, que combina o método Adam com regularização baseada em decaimento de peso (</a:t>
+              <a:t> substitui o tradicional Patch </a:t>
             </a:r>
             <a:r>
               <a:rPr lang="pt-BR" dirty="0" err="1"/>
-              <a:t>Weight</a:t>
+              <a:t>Embedding</a:t>
             </a:r>
             <a:r>
               <a:rPr lang="pt-BR" dirty="0"/>
-              <a:t> </a:t>
+              <a:t> do </a:t>
             </a:r>
             <a:r>
               <a:rPr lang="pt-BR" dirty="0" err="1"/>
-              <a:t>Decay</a:t>
+              <a:t>ViT</a:t>
             </a:r>
             <a:r>
               <a:rPr lang="pt-BR" dirty="0"/>
-              <a:t>), reduzindo o impacto de parâmetros menos relevantes. A taxa de aprendizado inicial foi definida como </a:t>
-            </a:r>
-            <a:r>
-              <a:rPr lang="pt-BR" b="1" dirty="0"/>
-              <a:t>4 × 10⁻⁶</a:t>
+              <a:t> por uma </a:t>
+            </a:r>
+            <a:r>
+              <a:rPr lang="pt-BR" b="1" dirty="0" err="1"/>
+              <a:t>ResNet</a:t>
             </a:r>
             <a:r>
               <a:rPr lang="pt-BR" dirty="0"/>
-              <a:t> e ajustada dinamicamente durante o treinamento por meio da técnica </a:t>
-            </a:r>
-            <a:r>
-              <a:rPr lang="pt-BR" b="1" dirty="0" err="1"/>
-              <a:t>ReduceLROnPlateau</a:t>
-            </a:r>
-            <a:r>
-              <a:rPr lang="pt-BR" dirty="0"/>
-              <a:t>, que reduz a taxa de aprendizado quando o modelo para de melhorar na validação.</a:t>
-            </a:r>
-          </a:p>
-          <a:p>
-            <a:r>
-              <a:rPr lang="pt-BR" dirty="0"/>
-              <a:t>Além disso, aplicamos </a:t>
-            </a:r>
-            <a:r>
-              <a:rPr lang="pt-BR" b="1" dirty="0"/>
-              <a:t>Early </a:t>
-            </a:r>
-            <a:r>
-              <a:rPr lang="pt-BR" b="1" dirty="0" err="1"/>
-              <a:t>Stopping</a:t>
-            </a:r>
-            <a:r>
-              <a:rPr lang="pt-BR" dirty="0"/>
-              <a:t>, interrompendo o treinamento caso o desempenho na validação não melhorasse após um número determinado de épocas, evitando o </a:t>
+              <a:t>, permitindo que a extração de características seja feita por uma CNN antes da aplicação do mecanismo de </a:t>
             </a:r>
             <a:r>
               <a:rPr lang="pt-BR" dirty="0" err="1"/>
-              <a:t>sobreajuste</a:t>
+              <a:t>autoatenção</a:t>
             </a:r>
             <a:r>
               <a:rPr lang="pt-BR" dirty="0"/>
@@ -1505,99 +1790,6 @@
           </a:p>
           <a:p>
             <a:endParaRPr lang="pt-BR" dirty="0"/>
-          </a:p>
-          <a:p>
-            <a:r>
-              <a:rPr lang="pt-BR" dirty="0"/>
-              <a:t>Para avaliação do desempenho dos modelos, utilizamos as seguintes métricas:</a:t>
-            </a:r>
-          </a:p>
-          <a:p>
-            <a:pPr>
-              <a:buFont typeface="Arial" panose="020B0604020202020204" pitchFamily="34" charset="0"/>
-              <a:buChar char="•"/>
-            </a:pPr>
-            <a:r>
-              <a:rPr lang="pt-BR" b="1" dirty="0"/>
-              <a:t>Acurácia</a:t>
-            </a:r>
-            <a:r>
-              <a:rPr lang="pt-BR" dirty="0"/>
-              <a:t>: percentual de predições corretas.</a:t>
-            </a:r>
-          </a:p>
-          <a:p>
-            <a:pPr>
-              <a:buFont typeface="Arial" panose="020B0604020202020204" pitchFamily="34" charset="0"/>
-              <a:buChar char="•"/>
-            </a:pPr>
-            <a:r>
-              <a:rPr lang="pt-BR" b="1" dirty="0"/>
-              <a:t>Perda </a:t>
-            </a:r>
-            <a:r>
-              <a:rPr lang="pt-BR" b="1" dirty="0" err="1"/>
-              <a:t>CrossEntropyLoss</a:t>
-            </a:r>
-            <a:r>
-              <a:rPr lang="pt-BR" dirty="0"/>
-              <a:t>: métrica de erro utilizada em classificações </a:t>
-            </a:r>
-            <a:r>
-              <a:rPr lang="pt-BR" dirty="0" err="1"/>
-              <a:t>multiclasse</a:t>
-            </a:r>
-            <a:r>
-              <a:rPr lang="pt-BR" dirty="0"/>
-              <a:t>.</a:t>
-            </a:r>
-          </a:p>
-          <a:p>
-            <a:pPr>
-              <a:buFont typeface="Arial" panose="020B0604020202020204" pitchFamily="34" charset="0"/>
-              <a:buChar char="•"/>
-            </a:pPr>
-            <a:r>
-              <a:rPr lang="pt-BR" b="1" dirty="0"/>
-              <a:t>Sensibilidade (Recall)</a:t>
-            </a:r>
-            <a:r>
-              <a:rPr lang="pt-BR" dirty="0"/>
-              <a:t>: métrica fundamental para garantir que o modelo seja eficaz na identificação de casos positivos de catarata.</a:t>
-            </a:r>
-          </a:p>
-          <a:p>
-            <a:endParaRPr lang="pt-BR" dirty="0"/>
-          </a:p>
-          <a:p>
-            <a:r>
-              <a:rPr lang="pt-BR" dirty="0"/>
-              <a:t>Onde: </a:t>
-            </a:r>
-          </a:p>
-          <a:p>
-            <a:r>
-              <a:rPr lang="pt-BR" dirty="0"/>
-              <a:t>• N é o número total de amostras, </a:t>
-            </a:r>
-          </a:p>
-          <a:p>
-            <a:r>
-              <a:rPr lang="pt-BR" dirty="0"/>
-              <a:t>• 𝐶 é o número de classes, </a:t>
-            </a:r>
-          </a:p>
-          <a:p>
-            <a:r>
-              <a:rPr lang="pt-BR" dirty="0"/>
-              <a:t>• 𝑦𝑖,𝑐 é o valor real (1 caso a classe seja correta, 0 caso contrário),</a:t>
-            </a:r>
-          </a:p>
-          <a:p>
-            <a:r>
-              <a:rPr lang="pt-BR" dirty="0"/>
-              <a:t>• 𝑝𝑖,𝑐 é a probabilidade prevista para a classe c da amostra i</a:t>
-            </a:r>
           </a:p>
         </p:txBody>
       </p:sp>
@@ -1619,7 +1811,7 @@
             <a:fld id="{5278106F-20E4-4638-BAF2-3768F6927375}" type="slidenum">
               <a:rPr lang="pt-BR" smtClean="0"/>
               <a:pPr/>
-              <a:t>15</a:t>
+              <a:t>14</a:t>
             </a:fld>
             <a:endParaRPr lang="pt-BR"/>
           </a:p>
@@ -1628,7 +1820,7 @@
     </p:spTree>
     <p:extLst>
       <p:ext uri="{BB962C8B-B14F-4D97-AF65-F5344CB8AC3E}">
-        <p14:creationId xmlns:p14="http://schemas.microsoft.com/office/powerpoint/2010/main" val="970410687"/>
+        <p14:creationId xmlns:p14="http://schemas.microsoft.com/office/powerpoint/2010/main" val="3963180503"/>
       </p:ext>
     </p:extLst>
   </p:cSld>
@@ -1684,32 +1876,156 @@
           <a:p>
             <a:r>
               <a:rPr lang="pt-BR" dirty="0"/>
-              <a:t>Os resultados dos experimentos demonstraram que as </a:t>
+              <a:t>O treinamento dos modelos foi realizado utilizando a </a:t>
             </a:r>
             <a:r>
               <a:rPr lang="pt-BR" b="1" dirty="0"/>
-              <a:t>Redes </a:t>
+              <a:t>biblioteca </a:t>
             </a:r>
             <a:r>
               <a:rPr lang="pt-BR" b="1" dirty="0" err="1"/>
-              <a:t>Convolucionais</a:t>
+              <a:t>PyTorch</a:t>
+            </a:r>
+            <a:r>
+              <a:rPr lang="pt-BR" dirty="0"/>
+              <a:t>, com uma abordagem otimizada para cenários de dados limitados. Para garantir um aprendizado eficiente, utilizamos o </a:t>
             </a:r>
             <a:r>
               <a:rPr lang="pt-BR" b="1" dirty="0"/>
-              <a:t> (</a:t>
+              <a:t>otimizador </a:t>
             </a:r>
             <a:r>
               <a:rPr lang="pt-BR" b="1" dirty="0" err="1"/>
-              <a:t>CNNs</a:t>
+              <a:t>AdamW</a:t>
+            </a:r>
+            <a:r>
+              <a:rPr lang="pt-BR" dirty="0"/>
+              <a:t>, que combina o método Adam com regularização baseada em decaimento de peso (</a:t>
+            </a:r>
+            <a:r>
+              <a:rPr lang="pt-BR" dirty="0" err="1"/>
+              <a:t>Weight</a:t>
+            </a:r>
+            <a:r>
+              <a:rPr lang="pt-BR" dirty="0"/>
+              <a:t> </a:t>
+            </a:r>
+            <a:r>
+              <a:rPr lang="pt-BR" dirty="0" err="1"/>
+              <a:t>Decay</a:t>
+            </a:r>
+            <a:r>
+              <a:rPr lang="pt-BR" dirty="0"/>
+              <a:t>), reduzindo o impacto de parâmetros menos relevantes. A taxa de aprendizado inicial foi definida como </a:t>
             </a:r>
             <a:r>
               <a:rPr lang="pt-BR" b="1" dirty="0"/>
-              <a:t>) foram mais eficazes do que os Vision Transformers na detecção de catarata em um cenário de dados limitados</a:t>
+              <a:t>4 × 10⁻⁶</a:t>
+            </a:r>
+            <a:r>
+              <a:rPr lang="pt-BR" dirty="0"/>
+              <a:t> e ajustada dinamicamente durante o treinamento por meio da técnica </a:t>
+            </a:r>
+            <a:r>
+              <a:rPr lang="pt-BR" b="1" dirty="0" err="1"/>
+              <a:t>ReduceLROnPlateau</a:t>
+            </a:r>
+            <a:r>
+              <a:rPr lang="pt-BR" dirty="0"/>
+              <a:t>, que reduz a taxa de aprendizado quando o modelo para de melhorar na validação.</a:t>
+            </a:r>
+          </a:p>
+          <a:p>
+            <a:r>
+              <a:rPr lang="pt-BR" dirty="0"/>
+              <a:t>Além disso, aplicamos </a:t>
+            </a:r>
+            <a:r>
+              <a:rPr lang="pt-BR" b="1" dirty="0"/>
+              <a:t>Early </a:t>
+            </a:r>
+            <a:r>
+              <a:rPr lang="pt-BR" b="1" dirty="0" err="1"/>
+              <a:t>Stopping</a:t>
+            </a:r>
+            <a:r>
+              <a:rPr lang="pt-BR" dirty="0"/>
+              <a:t>, interrompendo o treinamento caso o desempenho na validação não melhorasse após um número determinado de épocas, evitando o </a:t>
+            </a:r>
+            <a:r>
+              <a:rPr lang="pt-BR" dirty="0" err="1"/>
+              <a:t>sobreajuste</a:t>
             </a:r>
             <a:r>
               <a:rPr lang="pt-BR" dirty="0"/>
               <a:t>.</a:t>
             </a:r>
+          </a:p>
+          <a:p>
+            <a:endParaRPr lang="pt-BR" dirty="0"/>
+          </a:p>
+          <a:p>
+            <a:r>
+              <a:rPr lang="pt-BR" dirty="0"/>
+              <a:t>Para avaliação do desempenho dos modelos, utilizamos as seguintes métricas:</a:t>
+            </a:r>
+          </a:p>
+          <a:p>
+            <a:pPr>
+              <a:buFont typeface="Arial" panose="020B0604020202020204" pitchFamily="34" charset="0"/>
+              <a:buChar char="•"/>
+            </a:pPr>
+            <a:r>
+              <a:rPr lang="pt-BR" b="1" dirty="0"/>
+              <a:t>Acurácia</a:t>
+            </a:r>
+            <a:r>
+              <a:rPr lang="pt-BR" dirty="0"/>
+              <a:t>: percentual de predições corretas.</a:t>
+            </a:r>
+          </a:p>
+          <a:p>
+            <a:pPr>
+              <a:buFont typeface="Arial" panose="020B0604020202020204" pitchFamily="34" charset="0"/>
+              <a:buChar char="•"/>
+            </a:pPr>
+            <a:r>
+              <a:rPr lang="pt-BR" b="1" dirty="0"/>
+              <a:t>Perda </a:t>
+            </a:r>
+            <a:r>
+              <a:rPr lang="pt-BR" b="1" dirty="0" err="1"/>
+              <a:t>CrossEntropyLoss</a:t>
+            </a:r>
+            <a:r>
+              <a:rPr lang="pt-BR" dirty="0"/>
+              <a:t>: métrica de erro utilizada em classificações </a:t>
+            </a:r>
+            <a:r>
+              <a:rPr lang="pt-BR" dirty="0" err="1"/>
+              <a:t>multiclasse</a:t>
+            </a:r>
+            <a:r>
+              <a:rPr lang="pt-BR" dirty="0"/>
+              <a:t>.</a:t>
+            </a:r>
+          </a:p>
+          <a:p>
+            <a:pPr>
+              <a:buFont typeface="Arial" panose="020B0604020202020204" pitchFamily="34" charset="0"/>
+              <a:buChar char="•"/>
+            </a:pPr>
+            <a:r>
+              <a:rPr lang="pt-BR" b="1" dirty="0"/>
+              <a:t>Sensibilidade (Recall)</a:t>
+            </a:r>
+            <a:r>
+              <a:rPr lang="pt-BR" dirty="0"/>
+              <a:t>: métrica fundamental para garantir que o modelo seja eficaz na identificação de casos positivos de catarata.</a:t>
+            </a:r>
+          </a:p>
+          <a:p>
+            <a:endParaRPr lang="pt-BR" dirty="0"/>
           </a:p>
         </p:txBody>
       </p:sp>
@@ -1731,7 +2047,7 @@
             <a:fld id="{5278106F-20E4-4638-BAF2-3768F6927375}" type="slidenum">
               <a:rPr lang="pt-BR" smtClean="0"/>
               <a:pPr/>
-              <a:t>16</a:t>
+              <a:t>15</a:t>
             </a:fld>
             <a:endParaRPr lang="pt-BR"/>
           </a:p>
@@ -1740,7 +2056,7 @@
     </p:spTree>
     <p:extLst>
       <p:ext uri="{BB962C8B-B14F-4D97-AF65-F5344CB8AC3E}">
-        <p14:creationId xmlns:p14="http://schemas.microsoft.com/office/powerpoint/2010/main" val="1910466074"/>
+        <p14:creationId xmlns:p14="http://schemas.microsoft.com/office/powerpoint/2010/main" val="970410687"/>
       </p:ext>
     </p:extLst>
   </p:cSld>
@@ -1796,103 +2112,32 @@
           <a:p>
             <a:r>
               <a:rPr lang="pt-BR" dirty="0"/>
-              <a:t>Na </a:t>
+              <a:t>Os resultados dos experimentos demonstraram que as </a:t>
             </a:r>
             <a:r>
               <a:rPr lang="pt-BR" b="1" dirty="0"/>
-              <a:t>classificação binária (normal vs. catarata)</a:t>
+              <a:t>Redes </a:t>
+            </a:r>
+            <a:r>
+              <a:rPr lang="pt-BR" b="1" dirty="0" err="1"/>
+              <a:t>Convolucionais</a:t>
+            </a:r>
+            <a:r>
+              <a:rPr lang="pt-BR" b="1" dirty="0"/>
+              <a:t> (</a:t>
+            </a:r>
+            <a:r>
+              <a:rPr lang="pt-BR" b="1" dirty="0" err="1"/>
+              <a:t>CNNs</a:t>
+            </a:r>
+            <a:r>
+              <a:rPr lang="pt-BR" b="1" dirty="0"/>
+              <a:t>) foram mais eficazes do que os Vision Transformers na detecção de catarata em um cenário de dados limitados</a:t>
             </a:r>
             <a:r>
               <a:rPr lang="pt-BR" dirty="0"/>
-              <a:t>, os melhores resultados foram obtidos com </a:t>
-            </a:r>
-            <a:r>
-              <a:rPr lang="pt-BR" b="1" dirty="0" err="1"/>
-              <a:t>ResNet</a:t>
-            </a:r>
-            <a:r>
-              <a:rPr lang="pt-BR" b="1" dirty="0"/>
-              <a:t> e </a:t>
-            </a:r>
-            <a:r>
-              <a:rPr lang="pt-BR" b="1" dirty="0" err="1"/>
-              <a:t>ResNet-ViT</a:t>
-            </a:r>
-            <a:r>
-              <a:rPr lang="pt-BR" dirty="0"/>
-              <a:t>, que atingiram </a:t>
-            </a:r>
-            <a:r>
-              <a:rPr lang="pt-BR" b="1" dirty="0"/>
-              <a:t>100% de precisão no conjunto de testes</a:t>
-            </a:r>
-            <a:r>
-              <a:rPr lang="pt-BR" dirty="0"/>
-              <a:t> e mais de </a:t>
-            </a:r>
-            <a:r>
-              <a:rPr lang="pt-BR" b="1" dirty="0"/>
-              <a:t>95% na validação</a:t>
-            </a:r>
-            <a:r>
-              <a:rPr lang="pt-BR" dirty="0"/>
-              <a:t>. O </a:t>
-            </a:r>
-            <a:r>
-              <a:rPr lang="pt-BR" b="1" dirty="0" err="1"/>
-              <a:t>Compact</a:t>
-            </a:r>
-            <a:r>
-              <a:rPr lang="pt-BR" b="1" dirty="0"/>
-              <a:t> </a:t>
-            </a:r>
-            <a:r>
-              <a:rPr lang="pt-BR" b="1" dirty="0" err="1"/>
-              <a:t>Convolutional</a:t>
-            </a:r>
-            <a:r>
-              <a:rPr lang="pt-BR" b="1" dirty="0"/>
-              <a:t> </a:t>
-            </a:r>
-            <a:r>
-              <a:rPr lang="pt-BR" b="1" dirty="0" err="1"/>
-              <a:t>Transformer</a:t>
-            </a:r>
-            <a:r>
-              <a:rPr lang="pt-BR" b="1" dirty="0"/>
-              <a:t> (CCT)</a:t>
-            </a:r>
-            <a:r>
-              <a:rPr lang="pt-BR" dirty="0"/>
-              <a:t> também teve um bom desempenho, alcançando </a:t>
-            </a:r>
-            <a:r>
-              <a:rPr lang="pt-BR" b="1" dirty="0"/>
-              <a:t>98,44% de precisão</a:t>
-            </a:r>
-            <a:r>
-              <a:rPr lang="pt-BR" dirty="0"/>
-              <a:t>. Já o </a:t>
-            </a:r>
-            <a:r>
-              <a:rPr lang="pt-BR" b="1" dirty="0"/>
-              <a:t>EfficientNet-B0</a:t>
-            </a:r>
-            <a:r>
-              <a:rPr lang="pt-BR" dirty="0"/>
-              <a:t>, apesar de obter uma boa acurácia de </a:t>
-            </a:r>
-            <a:r>
-              <a:rPr lang="pt-BR" b="1" dirty="0"/>
-              <a:t>95,31%</a:t>
-            </a:r>
-            <a:r>
-              <a:rPr lang="pt-BR" dirty="0"/>
-              <a:t>, exigiu um tempo de treinamento significativamente maior (100 épocas).</a:t>
-            </a:r>
-          </a:p>
-          <a:p>
-            <a:endParaRPr lang="pt-BR" dirty="0"/>
+              <a:t>.</a:t>
+            </a:r>
           </a:p>
         </p:txBody>
       </p:sp>
@@ -1914,7 +2159,7 @@
             <a:fld id="{5278106F-20E4-4638-BAF2-3768F6927375}" type="slidenum">
               <a:rPr lang="pt-BR" smtClean="0"/>
               <a:pPr/>
-              <a:t>17</a:t>
+              <a:t>16</a:t>
             </a:fld>
             <a:endParaRPr lang="pt-BR"/>
           </a:p>
@@ -1923,7 +2168,7 @@
     </p:spTree>
     <p:extLst>
       <p:ext uri="{BB962C8B-B14F-4D97-AF65-F5344CB8AC3E}">
-        <p14:creationId xmlns:p14="http://schemas.microsoft.com/office/powerpoint/2010/main" val="2403660606"/>
+        <p14:creationId xmlns:p14="http://schemas.microsoft.com/office/powerpoint/2010/main" val="1910466074"/>
       </p:ext>
     </p:extLst>
   </p:cSld>
@@ -1983,15 +2228,19 @@
             </a:r>
             <a:r>
               <a:rPr lang="pt-BR" b="1" dirty="0"/>
-              <a:t>classificação </a:t>
+              <a:t>classificação binária (normal vs. catarata)</a:t>
+            </a:r>
+            <a:r>
+              <a:rPr lang="pt-BR" dirty="0"/>
+              <a:t>, os melhores resultados foram obtidos com </a:t>
             </a:r>
             <a:r>
               <a:rPr lang="pt-BR" b="1" dirty="0" err="1"/>
-              <a:t>multiclasse</a:t>
-            </a:r>
-            <a:r>
-              <a:rPr lang="pt-BR" dirty="0"/>
-              <a:t>, o modelo </a:t>
+              <a:t>ResNet</a:t>
+            </a:r>
+            <a:r>
+              <a:rPr lang="pt-BR" b="1" dirty="0"/>
+              <a:t> e </a:t>
             </a:r>
             <a:r>
               <a:rPr lang="pt-BR" b="1" dirty="0" err="1"/>
@@ -1999,56 +2248,79 @@
             </a:r>
             <a:r>
               <a:rPr lang="pt-BR" dirty="0"/>
-              <a:t> novamente obteve o melhor resultado, com </a:t>
+              <a:t>, que atingiram </a:t>
             </a:r>
             <a:r>
               <a:rPr lang="pt-BR" b="1" dirty="0"/>
-              <a:t>95,31% de precisão no teste</a:t>
+              <a:t>100% de precisão no conjunto de testes</a:t>
             </a:r>
             <a:r>
               <a:rPr lang="pt-BR" dirty="0"/>
-              <a:t>, seguido pela </a:t>
+              <a:t> e mais de </a:t>
+            </a:r>
+            <a:r>
+              <a:rPr lang="pt-BR" b="1" dirty="0"/>
+              <a:t>95% na validação</a:t>
+            </a:r>
+            <a:r>
+              <a:rPr lang="pt-BR" dirty="0"/>
+              <a:t>. O </a:t>
             </a:r>
             <a:r>
               <a:rPr lang="pt-BR" b="1" dirty="0" err="1"/>
-              <a:t>ResNet</a:t>
+              <a:t>Compact</a:t>
             </a:r>
             <a:r>
               <a:rPr lang="pt-BR" b="1" dirty="0"/>
-              <a:t> (89,84%)</a:t>
+              <a:t> </a:t>
+            </a:r>
+            <a:r>
+              <a:rPr lang="pt-BR" b="1" dirty="0" err="1"/>
+              <a:t>Convolutional</a:t>
+            </a:r>
+            <a:r>
+              <a:rPr lang="pt-BR" b="1" dirty="0"/>
+              <a:t> </a:t>
+            </a:r>
+            <a:r>
+              <a:rPr lang="pt-BR" b="1" dirty="0" err="1"/>
+              <a:t>Transformer</a:t>
+            </a:r>
+            <a:r>
+              <a:rPr lang="pt-BR" b="1" dirty="0"/>
+              <a:t> (CCT)</a:t>
             </a:r>
             <a:r>
               <a:rPr lang="pt-BR" dirty="0"/>
-              <a:t>. No entanto, os modelos puramente baseados em Transformers, como </a:t>
-            </a:r>
-            <a:r>
-              <a:rPr lang="pt-BR" b="1" dirty="0" err="1"/>
-              <a:t>ViT</a:t>
+              <a:t> também teve um bom desempenho, alcançando </a:t>
             </a:r>
             <a:r>
               <a:rPr lang="pt-BR" b="1" dirty="0"/>
-              <a:t>-Lite</a:t>
+              <a:t>98,44% de precisão</a:t>
             </a:r>
             <a:r>
               <a:rPr lang="pt-BR" dirty="0"/>
-              <a:t>, apresentaram dificuldades para generalizar, com um desempenho abaixo de </a:t>
+              <a:t>. Já o </a:t>
             </a:r>
             <a:r>
               <a:rPr lang="pt-BR" b="1" dirty="0"/>
-              <a:t>70% na validação</a:t>
+              <a:t>EfficientNet-B0</a:t>
             </a:r>
             <a:r>
               <a:rPr lang="pt-BR" dirty="0"/>
-              <a:t>. Isso confirma a </a:t>
+              <a:t>, apesar de obter uma boa acurácia de </a:t>
             </a:r>
             <a:r>
               <a:rPr lang="pt-BR" b="1" dirty="0"/>
-              <a:t>sensibilidade dos Transformers ao tamanho da base de dados</a:t>
+              <a:t>95,31%</a:t>
             </a:r>
             <a:r>
               <a:rPr lang="pt-BR" dirty="0"/>
-              <a:t>, reforçando a importância de utilizar modelos híbridos ou técnicas adicionais para melhorar a generalização</a:t>
-            </a:r>
+              <a:t>, exigiu um tempo de treinamento significativamente maior (100 épocas).</a:t>
+            </a:r>
+          </a:p>
+          <a:p>
+            <a:endParaRPr lang="pt-BR" dirty="0"/>
           </a:p>
         </p:txBody>
       </p:sp>
@@ -2070,7 +2342,7 @@
             <a:fld id="{5278106F-20E4-4638-BAF2-3768F6927375}" type="slidenum">
               <a:rPr lang="pt-BR" smtClean="0"/>
               <a:pPr/>
-              <a:t>18</a:t>
+              <a:t>17</a:t>
             </a:fld>
             <a:endParaRPr lang="pt-BR"/>
           </a:p>
@@ -2079,7 +2351,7 @@
     </p:spTree>
     <p:extLst>
       <p:ext uri="{BB962C8B-B14F-4D97-AF65-F5344CB8AC3E}">
-        <p14:creationId xmlns:p14="http://schemas.microsoft.com/office/powerpoint/2010/main" val="3651097300"/>
+        <p14:creationId xmlns:p14="http://schemas.microsoft.com/office/powerpoint/2010/main" val="2403660606"/>
       </p:ext>
     </p:extLst>
   </p:cSld>
@@ -2135,41 +2407,76 @@
           <a:p>
             <a:r>
               <a:rPr lang="pt-BR" dirty="0"/>
-              <a:t>Outro ponto relevante é o impacto da profundidade da rede no desempenho. </a:t>
+              <a:t>Na </a:t>
             </a:r>
             <a:r>
               <a:rPr lang="pt-BR" b="1" dirty="0"/>
-              <a:t>Redes muito profundas, como ResNet18, não apresentaram ganhos significativos em comparação com versões mais leves, como ResNet6 e ResNet8</a:t>
+              <a:t>classificação </a:t>
+            </a:r>
+            <a:r>
+              <a:rPr lang="pt-BR" b="1" dirty="0" err="1"/>
+              <a:t>multiclasse</a:t>
             </a:r>
             <a:r>
               <a:rPr lang="pt-BR" dirty="0"/>
-              <a:t>, o que sugere que modelos mais compactos podem ser mais adequados para este tipo de aplicação.</a:t>
-            </a:r>
-          </a:p>
-          <a:p>
+              <a:t>, o modelo </a:t>
+            </a:r>
+            <a:r>
+              <a:rPr lang="pt-BR" b="1" dirty="0" err="1"/>
+              <a:t>ResNet-ViT</a:t>
+            </a:r>
             <a:r>
               <a:rPr lang="pt-BR" dirty="0"/>
-              <a:t>Com base nesses resultados, podemos afirmar que </a:t>
+              <a:t> novamente obteve o melhor resultado, com </a:t>
             </a:r>
             <a:r>
               <a:rPr lang="pt-BR" b="1" dirty="0"/>
-              <a:t>modelos baseados em </a:t>
+              <a:t>95,31% de precisão no teste</a:t>
+            </a:r>
+            <a:r>
+              <a:rPr lang="pt-BR" dirty="0"/>
+              <a:t>, seguido pela </a:t>
             </a:r>
             <a:r>
               <a:rPr lang="pt-BR" b="1" dirty="0" err="1"/>
-              <a:t>CNNs</a:t>
+              <a:t>ResNet</a:t>
             </a:r>
             <a:r>
               <a:rPr lang="pt-BR" b="1" dirty="0"/>
-              <a:t> são a melhor escolha para a detecção de catarata em um contexto de dados limitados, enquanto Transformers precisam de grandes volumes de dados para alcançar resultados competitivos</a:t>
+              <a:t> (89,84%)</a:t>
             </a:r>
             <a:r>
               <a:rPr lang="pt-BR" dirty="0"/>
-              <a:t>.</a:t>
-            </a:r>
-          </a:p>
-          <a:p>
-            <a:endParaRPr lang="pt-BR" dirty="0"/>
+              <a:t>. No entanto, os modelos puramente baseados em Transformers, como </a:t>
+            </a:r>
+            <a:r>
+              <a:rPr lang="pt-BR" b="1" dirty="0" err="1"/>
+              <a:t>ViT</a:t>
+            </a:r>
+            <a:r>
+              <a:rPr lang="pt-BR" b="1" dirty="0"/>
+              <a:t>-Lite</a:t>
+            </a:r>
+            <a:r>
+              <a:rPr lang="pt-BR" dirty="0"/>
+              <a:t>, apresentaram dificuldades para generalizar, com um desempenho abaixo de </a:t>
+            </a:r>
+            <a:r>
+              <a:rPr lang="pt-BR" b="1" dirty="0"/>
+              <a:t>70% na validação</a:t>
+            </a:r>
+            <a:r>
+              <a:rPr lang="pt-BR" dirty="0"/>
+              <a:t>. Isso confirma a </a:t>
+            </a:r>
+            <a:r>
+              <a:rPr lang="pt-BR" b="1" dirty="0"/>
+              <a:t>sensibilidade dos Transformers ao tamanho da base de dados</a:t>
+            </a:r>
+            <a:r>
+              <a:rPr lang="pt-BR" dirty="0"/>
+              <a:t>, reforçando a importância de utilizar modelos híbridos ou técnicas adicionais para melhorar a generalização</a:t>
+            </a:r>
           </a:p>
         </p:txBody>
       </p:sp>
@@ -2191,6 +2498,127 @@
             <a:fld id="{5278106F-20E4-4638-BAF2-3768F6927375}" type="slidenum">
               <a:rPr lang="pt-BR" smtClean="0"/>
               <a:pPr/>
+              <a:t>18</a:t>
+            </a:fld>
+            <a:endParaRPr lang="pt-BR"/>
+          </a:p>
+        </p:txBody>
+      </p:sp>
+    </p:spTree>
+    <p:extLst>
+      <p:ext uri="{BB962C8B-B14F-4D97-AF65-F5344CB8AC3E}">
+        <p14:creationId xmlns:p14="http://schemas.microsoft.com/office/powerpoint/2010/main" val="3651097300"/>
+      </p:ext>
+    </p:extLst>
+  </p:cSld>
+  <p:clrMapOvr>
+    <a:masterClrMapping/>
+  </p:clrMapOvr>
+</p:notes>
+</file>
+
+<file path=ppt/notesSlides/notesSlide18.xml><?xml version="1.0" encoding="utf-8"?>
+<p:notes xmlns:a="http://schemas.openxmlformats.org/drawingml/2006/main" xmlns:r="http://schemas.openxmlformats.org/officeDocument/2006/relationships" xmlns:p="http://schemas.openxmlformats.org/presentationml/2006/main">
+  <p:cSld>
+    <p:spTree>
+      <p:nvGrpSpPr>
+        <p:cNvPr id="1" name=""/>
+        <p:cNvGrpSpPr/>
+        <p:nvPr/>
+      </p:nvGrpSpPr>
+      <p:grpSpPr>
+        <a:xfrm>
+          <a:off x="0" y="0"/>
+          <a:ext cx="0" cy="0"/>
+          <a:chOff x="0" y="0"/>
+          <a:chExt cx="0" cy="0"/>
+        </a:xfrm>
+      </p:grpSpPr>
+      <p:sp>
+        <p:nvSpPr>
+          <p:cNvPr id="2" name="Espaço Reservado para Imagem de Slide 1"/>
+          <p:cNvSpPr>
+            <a:spLocks noGrp="1" noRot="1" noChangeAspect="1"/>
+          </p:cNvSpPr>
+          <p:nvPr>
+            <p:ph type="sldImg"/>
+          </p:nvPr>
+        </p:nvSpPr>
+        <p:spPr/>
+      </p:sp>
+      <p:sp>
+        <p:nvSpPr>
+          <p:cNvPr id="3" name="Espaço Reservado para Anotações 2"/>
+          <p:cNvSpPr>
+            <a:spLocks noGrp="1"/>
+          </p:cNvSpPr>
+          <p:nvPr>
+            <p:ph type="body" idx="1"/>
+          </p:nvPr>
+        </p:nvSpPr>
+        <p:spPr/>
+        <p:txBody>
+          <a:bodyPr/>
+          <a:lstStyle/>
+          <a:p>
+            <a:r>
+              <a:rPr lang="pt-BR" dirty="0"/>
+              <a:t>Outro ponto relevante é o impacto da profundidade da rede no desempenho. </a:t>
+            </a:r>
+            <a:r>
+              <a:rPr lang="pt-BR" b="1" dirty="0"/>
+              <a:t>Redes muito profundas, como ResNet18, não apresentaram ganhos significativos em comparação com versões mais leves, como ResNet6 e ResNet8</a:t>
+            </a:r>
+            <a:r>
+              <a:rPr lang="pt-BR" dirty="0"/>
+              <a:t>, o que sugere que modelos mais compactos podem ser mais adequados para este tipo de aplicação.</a:t>
+            </a:r>
+          </a:p>
+          <a:p>
+            <a:r>
+              <a:rPr lang="pt-BR" dirty="0"/>
+              <a:t>Com base nesses resultados, podemos afirmar que </a:t>
+            </a:r>
+            <a:r>
+              <a:rPr lang="pt-BR" b="1" dirty="0"/>
+              <a:t>modelos baseados em </a:t>
+            </a:r>
+            <a:r>
+              <a:rPr lang="pt-BR" b="1" dirty="0" err="1"/>
+              <a:t>CNNs</a:t>
+            </a:r>
+            <a:r>
+              <a:rPr lang="pt-BR" b="1" dirty="0"/>
+              <a:t> são a melhor escolha para a detecção de catarata em um contexto de dados limitados, enquanto Transformers precisam de grandes volumes de dados para alcançar resultados competitivos</a:t>
+            </a:r>
+            <a:r>
+              <a:rPr lang="pt-BR" dirty="0"/>
+              <a:t>.</a:t>
+            </a:r>
+          </a:p>
+          <a:p>
+            <a:endParaRPr lang="pt-BR" dirty="0"/>
+          </a:p>
+        </p:txBody>
+      </p:sp>
+      <p:sp>
+        <p:nvSpPr>
+          <p:cNvPr id="4" name="Espaço Reservado para Número de Slide 3"/>
+          <p:cNvSpPr>
+            <a:spLocks noGrp="1"/>
+          </p:cNvSpPr>
+          <p:nvPr>
+            <p:ph type="sldNum" sz="quarter" idx="5"/>
+          </p:nvPr>
+        </p:nvSpPr>
+        <p:spPr/>
+        <p:txBody>
+          <a:bodyPr/>
+          <a:lstStyle/>
+          <a:p>
+            <a:fld id="{5278106F-20E4-4638-BAF2-3768F6927375}" type="slidenum">
+              <a:rPr lang="pt-BR" smtClean="0"/>
+              <a:pPr/>
               <a:t>19</a:t>
             </a:fld>
             <a:endParaRPr lang="pt-BR"/>
@@ -2210,7 +2638,7 @@
 </p:notes>
 </file>
 
-<file path=ppt/notesSlides/notesSlide18.xml><?xml version="1.0" encoding="utf-8"?>
+<file path=ppt/notesSlides/notesSlide19.xml><?xml version="1.0" encoding="utf-8"?>
 <p:notes xmlns:a="http://schemas.openxmlformats.org/drawingml/2006/main" xmlns:r="http://schemas.openxmlformats.org/officeDocument/2006/relationships" xmlns:p="http://schemas.openxmlformats.org/presentationml/2006/main">
   <p:cSld>
     <p:spTree>
@@ -3840,7 +4268,7 @@
             <a:fld id="{5278106F-20E4-4638-BAF2-3768F6927375}" type="slidenum">
               <a:rPr lang="pt-BR" smtClean="0"/>
               <a:pPr/>
-              <a:t>10</a:t>
+              <a:t>9</a:t>
             </a:fld>
             <a:endParaRPr lang="pt-BR"/>
           </a:p>
@@ -3849,7 +4277,7 @@
     </p:spTree>
     <p:extLst>
       <p:ext uri="{BB962C8B-B14F-4D97-AF65-F5344CB8AC3E}">
-        <p14:creationId xmlns:p14="http://schemas.microsoft.com/office/powerpoint/2010/main" val="1835597660"/>
+        <p14:creationId xmlns:p14="http://schemas.microsoft.com/office/powerpoint/2010/main" val="2775317353"/>
       </p:ext>
     </p:extLst>
   </p:cSld>
@@ -3905,378 +4333,48 @@
           <a:p>
             <a:r>
               <a:rPr lang="pt-BR" dirty="0"/>
-              <a:t>Apesar do grande sucesso dos Transformers no NLP, sua aplicação em </a:t>
-            </a:r>
-            <a:r>
-              <a:rPr lang="pt-BR" b="1" dirty="0"/>
-              <a:t>Visão Computacional</a:t>
+              <a:t>Os </a:t>
+            </a:r>
+            <a:r>
+              <a:rPr lang="pt-BR" dirty="0" err="1"/>
+              <a:t>transformers</a:t>
             </a:r>
             <a:r>
               <a:rPr lang="pt-BR" dirty="0"/>
-              <a:t> só ocorreu recentemente, com a introdução do </a:t>
-            </a:r>
-            <a:r>
-              <a:rPr lang="pt-BR" b="1" dirty="0"/>
-              <a:t>Vision </a:t>
-            </a:r>
-            <a:r>
-              <a:rPr lang="pt-BR" b="1" dirty="0" err="1"/>
-              <a:t>Transformer</a:t>
-            </a:r>
-            <a:r>
-              <a:rPr lang="pt-BR" b="1" dirty="0"/>
-              <a:t> (</a:t>
-            </a:r>
-            <a:r>
-              <a:rPr lang="pt-BR" b="1" dirty="0" err="1"/>
-              <a:t>ViT</a:t>
-            </a:r>
-            <a:r>
-              <a:rPr lang="pt-BR" b="1" dirty="0"/>
-              <a:t>)</a:t>
+              <a:t> são estruturados com atenção </a:t>
+            </a:r>
+            <a:r>
+              <a:rPr lang="pt-BR" dirty="0" err="1"/>
+              <a:t>multicabeça</a:t>
             </a:r>
             <a:r>
               <a:rPr lang="pt-BR" dirty="0"/>
-              <a:t>. Diferente das redes </a:t>
+              <a:t>, que nada mais é o mecanismo de atenção em múltiplas cabeças em paralelo, da camada </a:t>
             </a:r>
             <a:r>
               <a:rPr lang="pt-BR" dirty="0" err="1"/>
-              <a:t>convolucionais</a:t>
+              <a:t>feedfoward</a:t>
             </a:r>
             <a:r>
               <a:rPr lang="pt-BR" dirty="0"/>
-              <a:t>, que utilizam filtros para extrair características locais da imagem, o </a:t>
+              <a:t> de múltiplos </a:t>
             </a:r>
             <a:r>
               <a:rPr lang="pt-BR" dirty="0" err="1"/>
-              <a:t>ViT</a:t>
+              <a:t>perceptons</a:t>
             </a:r>
             <a:r>
               <a:rPr lang="pt-BR" dirty="0"/>
-              <a:t> trata imagens de maneira semelhante ao processamento de texto, dividindo-as em </a:t>
-            </a:r>
-            <a:r>
-              <a:rPr lang="pt-BR" b="1" dirty="0"/>
-              <a:t>pequenos patches</a:t>
+              <a:t>, esta sendo a camada aonde é armazenado o conhecimento, uma camada de normalização e a camada de saída que </a:t>
+            </a:r>
+            <a:r>
+              <a:rPr lang="pt-BR" dirty="0" err="1"/>
+              <a:t>porcessa</a:t>
             </a:r>
             <a:r>
               <a:rPr lang="pt-BR" dirty="0"/>
-              <a:t> e processando cada um como um </a:t>
-            </a:r>
-            <a:r>
-              <a:rPr lang="pt-BR" b="1" dirty="0"/>
-              <a:t>token</a:t>
-            </a:r>
-            <a:r>
-              <a:rPr lang="pt-BR" dirty="0"/>
-              <a:t> dentro do modelo de atenção.</a:t>
-            </a:r>
-          </a:p>
-          <a:p>
-            <a:r>
-              <a:rPr lang="pt-BR" dirty="0"/>
-              <a:t>O primeiro passo do </a:t>
-            </a:r>
-            <a:r>
-              <a:rPr lang="pt-BR" dirty="0" err="1"/>
-              <a:t>ViT</a:t>
-            </a:r>
-            <a:r>
-              <a:rPr lang="pt-BR" dirty="0"/>
-              <a:t> é a </a:t>
-            </a:r>
-            <a:r>
-              <a:rPr lang="pt-BR" b="1" dirty="0"/>
-              <a:t>divisão da imagem em patches de tamanho fixo</a:t>
-            </a:r>
-            <a:r>
-              <a:rPr lang="pt-BR" dirty="0"/>
-              <a:t>. Cada patch é transformado em um vetor por meio de uma camada chamada </a:t>
-            </a:r>
-            <a:r>
-              <a:rPr lang="pt-BR" b="1" dirty="0"/>
-              <a:t>Patch </a:t>
-            </a:r>
-            <a:r>
-              <a:rPr lang="pt-BR" b="1" dirty="0" err="1"/>
-              <a:t>Embedding</a:t>
-            </a:r>
-            <a:r>
-              <a:rPr lang="pt-BR" dirty="0"/>
-              <a:t>, que projeta a informação espacial para um espaço vetorial adequado para o </a:t>
-            </a:r>
-            <a:r>
-              <a:rPr lang="pt-BR" dirty="0" err="1"/>
-              <a:t>Transformer</a:t>
-            </a:r>
-            <a:r>
-              <a:rPr lang="pt-BR" dirty="0"/>
-              <a:t>. Para garantir que a ordem dos patches seja preservada, adiciona-se uma informação adicional chamada </a:t>
-            </a:r>
-            <a:r>
-              <a:rPr lang="pt-BR" b="1" dirty="0" err="1"/>
-              <a:t>Positional</a:t>
-            </a:r>
-            <a:r>
-              <a:rPr lang="pt-BR" b="1" dirty="0"/>
-              <a:t> </a:t>
-            </a:r>
-            <a:r>
-              <a:rPr lang="pt-BR" b="1" dirty="0" err="1"/>
-              <a:t>Encoding</a:t>
-            </a:r>
-            <a:r>
-              <a:rPr lang="pt-BR" dirty="0"/>
-              <a:t>, que fornece um indicativo da posição original de cada patch na imagem.</a:t>
-            </a:r>
-          </a:p>
-          <a:p>
-            <a:r>
-              <a:rPr lang="pt-BR" dirty="0"/>
-              <a:t>Depois dessa etapa, os vetores são passados para várias camadas do </a:t>
-            </a:r>
-            <a:r>
-              <a:rPr lang="pt-BR" dirty="0" err="1"/>
-              <a:t>Transformer</a:t>
-            </a:r>
-            <a:r>
-              <a:rPr lang="pt-BR" dirty="0"/>
-              <a:t>, onde ocorre o processamento de </a:t>
-            </a:r>
-            <a:r>
-              <a:rPr lang="pt-BR" dirty="0" err="1"/>
-              <a:t>autoatenção</a:t>
-            </a:r>
-            <a:r>
-              <a:rPr lang="pt-BR" dirty="0"/>
-              <a:t>. A diferença fundamental entre o </a:t>
-            </a:r>
-            <a:r>
-              <a:rPr lang="pt-BR" dirty="0" err="1"/>
-              <a:t>ViT</a:t>
-            </a:r>
-            <a:r>
-              <a:rPr lang="pt-BR" dirty="0"/>
-              <a:t> e uma CNN é que, enquanto as redes </a:t>
-            </a:r>
-            <a:r>
-              <a:rPr lang="pt-BR" dirty="0" err="1"/>
-              <a:t>convolucionais</a:t>
-            </a:r>
-            <a:r>
-              <a:rPr lang="pt-BR" dirty="0"/>
-              <a:t> extraem características locais da imagem por meio de filtros especializados, o </a:t>
-            </a:r>
-            <a:r>
-              <a:rPr lang="pt-BR" dirty="0" err="1"/>
-              <a:t>ViT</a:t>
-            </a:r>
-            <a:r>
-              <a:rPr lang="pt-BR" dirty="0"/>
-              <a:t> processa a imagem de forma </a:t>
-            </a:r>
-            <a:r>
-              <a:rPr lang="pt-BR" b="1" dirty="0"/>
-              <a:t>global</a:t>
-            </a:r>
-            <a:r>
-              <a:rPr lang="pt-BR" dirty="0"/>
-              <a:t>, permitindo que cada parte da imagem interaja diretamente com todas as outras partes. No final do modelo, um </a:t>
-            </a:r>
-            <a:r>
-              <a:rPr lang="pt-BR" b="1" dirty="0"/>
-              <a:t>Token de Classe</a:t>
-            </a:r>
-            <a:r>
-              <a:rPr lang="pt-BR" dirty="0"/>
-              <a:t> é adicionado e utilizado para representar a saída final da rede, equivalente à predição do modelo.</a:t>
-            </a:r>
-          </a:p>
-          <a:p>
-            <a:r>
-              <a:rPr lang="pt-BR" b="1" dirty="0"/>
-              <a:t>Desafios do Vision </a:t>
-            </a:r>
-            <a:r>
-              <a:rPr lang="pt-BR" b="1" dirty="0" err="1"/>
-              <a:t>Transformer</a:t>
-            </a:r>
-            <a:endParaRPr lang="pt-BR" b="1" dirty="0"/>
-          </a:p>
-          <a:p>
-            <a:r>
-              <a:rPr lang="pt-BR" dirty="0"/>
-              <a:t>Embora o </a:t>
-            </a:r>
-            <a:r>
-              <a:rPr lang="pt-BR" dirty="0" err="1"/>
-              <a:t>ViT</a:t>
-            </a:r>
-            <a:r>
-              <a:rPr lang="pt-BR" dirty="0"/>
-              <a:t> tenha demonstrado resultados impressionantes em grandes bases de dados, como </a:t>
-            </a:r>
-            <a:r>
-              <a:rPr lang="pt-BR" b="1" dirty="0"/>
-              <a:t>ImageNet-21k</a:t>
-            </a:r>
-            <a:r>
-              <a:rPr lang="pt-BR" dirty="0"/>
-              <a:t>, ele apresenta alguns desafios significativos. O principal deles é a necessidade de </a:t>
-            </a:r>
-            <a:r>
-              <a:rPr lang="pt-BR" b="1" dirty="0"/>
-              <a:t>grandes quantidades de dados para generalizar bem</a:t>
-            </a:r>
-            <a:r>
-              <a:rPr lang="pt-BR" dirty="0"/>
-              <a:t>, pois, ao contrário das </a:t>
-            </a:r>
-            <a:r>
-              <a:rPr lang="pt-BR" dirty="0" err="1"/>
-              <a:t>CNNs</a:t>
-            </a:r>
-            <a:r>
-              <a:rPr lang="pt-BR" dirty="0"/>
-              <a:t>, o </a:t>
-            </a:r>
-            <a:r>
-              <a:rPr lang="pt-BR" dirty="0" err="1"/>
-              <a:t>ViT</a:t>
-            </a:r>
-            <a:r>
-              <a:rPr lang="pt-BR" dirty="0"/>
-              <a:t> não possui filtros </a:t>
-            </a:r>
-            <a:r>
-              <a:rPr lang="pt-BR" dirty="0" err="1"/>
-              <a:t>convolucionais</a:t>
-            </a:r>
-            <a:r>
-              <a:rPr lang="pt-BR" dirty="0"/>
-              <a:t> para aprender representações visuais eficientes em pequenos conjuntos de dados. Isso faz com que o </a:t>
-            </a:r>
-            <a:r>
-              <a:rPr lang="pt-BR" dirty="0" err="1"/>
-              <a:t>ViT</a:t>
-            </a:r>
-            <a:r>
-              <a:rPr lang="pt-BR" dirty="0"/>
-              <a:t> tenha </a:t>
-            </a:r>
-            <a:r>
-              <a:rPr lang="pt-BR" b="1" dirty="0"/>
-              <a:t>desempenho inferior em bases pequenas</a:t>
-            </a:r>
-            <a:r>
-              <a:rPr lang="pt-BR" dirty="0"/>
-              <a:t>, tornando-se uma escolha menos viável para aplicações médicas onde a disponibilidade de imagens rotuladas pode ser limitada.</a:t>
-            </a:r>
-          </a:p>
-          <a:p>
-            <a:r>
-              <a:rPr lang="pt-BR" dirty="0"/>
-              <a:t>Para contornar essa limitação, foram desenvolvidas abordagens híbridas que combinam </a:t>
-            </a:r>
-            <a:r>
-              <a:rPr lang="pt-BR" b="1" dirty="0" err="1"/>
-              <a:t>CNNs</a:t>
-            </a:r>
-            <a:r>
-              <a:rPr lang="pt-BR" b="1" dirty="0"/>
-              <a:t> e Transformers</a:t>
-            </a:r>
-            <a:r>
-              <a:rPr lang="pt-BR" dirty="0"/>
-              <a:t>. Um exemplo dessa estratégia é o </a:t>
-            </a:r>
-            <a:r>
-              <a:rPr lang="pt-BR" b="1" dirty="0" err="1"/>
-              <a:t>ResNet-ViT</a:t>
-            </a:r>
-            <a:r>
-              <a:rPr lang="pt-BR" dirty="0"/>
-              <a:t>, onde uma </a:t>
-            </a:r>
-            <a:r>
-              <a:rPr lang="pt-BR" dirty="0" err="1"/>
-              <a:t>ResNet</a:t>
-            </a:r>
-            <a:r>
-              <a:rPr lang="pt-BR" dirty="0"/>
-              <a:t> é utilizada para extrair características da imagem antes de alimentar o </a:t>
-            </a:r>
-            <a:r>
-              <a:rPr lang="pt-BR" dirty="0" err="1"/>
-              <a:t>Transformer</a:t>
-            </a:r>
-            <a:r>
-              <a:rPr lang="pt-BR" dirty="0"/>
-              <a:t>, substituindo o tradicional Patch </a:t>
-            </a:r>
-            <a:r>
-              <a:rPr lang="pt-BR" dirty="0" err="1"/>
-              <a:t>Embedding</a:t>
-            </a:r>
-            <a:r>
-              <a:rPr lang="pt-BR" dirty="0"/>
-              <a:t>. Outra alternativa é o </a:t>
-            </a:r>
-            <a:r>
-              <a:rPr lang="pt-BR" b="1" dirty="0" err="1"/>
-              <a:t>Compact</a:t>
-            </a:r>
-            <a:r>
-              <a:rPr lang="pt-BR" b="1" dirty="0"/>
-              <a:t> </a:t>
-            </a:r>
-            <a:r>
-              <a:rPr lang="pt-BR" b="1" dirty="0" err="1"/>
-              <a:t>Convolutional</a:t>
-            </a:r>
-            <a:r>
-              <a:rPr lang="pt-BR" b="1" dirty="0"/>
-              <a:t> </a:t>
-            </a:r>
-            <a:r>
-              <a:rPr lang="pt-BR" b="1" dirty="0" err="1"/>
-              <a:t>Transformer</a:t>
-            </a:r>
-            <a:r>
-              <a:rPr lang="pt-BR" b="1" dirty="0"/>
-              <a:t> (CCT)</a:t>
-            </a:r>
-            <a:r>
-              <a:rPr lang="pt-BR" dirty="0"/>
-              <a:t>, que incorpora uma camada </a:t>
-            </a:r>
-            <a:r>
-              <a:rPr lang="pt-BR" dirty="0" err="1"/>
-              <a:t>convolucional</a:t>
-            </a:r>
-            <a:r>
-              <a:rPr lang="pt-BR" dirty="0"/>
-              <a:t> na entrada do </a:t>
-            </a:r>
-            <a:r>
-              <a:rPr lang="pt-BR" dirty="0" err="1"/>
-              <a:t>ViT</a:t>
-            </a:r>
-            <a:r>
-              <a:rPr lang="pt-BR" dirty="0"/>
-              <a:t>, garantindo que a rede aprenda características locais antes de aplicar a </a:t>
-            </a:r>
-            <a:r>
-              <a:rPr lang="pt-BR" dirty="0" err="1"/>
-              <a:t>autoatenção</a:t>
-            </a:r>
-            <a:r>
-              <a:rPr lang="pt-BR" dirty="0"/>
-              <a:t> global.</a:t>
-            </a:r>
-          </a:p>
-          <a:p>
-            <a:endParaRPr lang="pt-BR" dirty="0"/>
+              <a:t> os token para a tarefa final.</a:t>
+            </a:r>
           </a:p>
         </p:txBody>
       </p:sp>
@@ -4298,7 +4396,7 @@
             <a:fld id="{5278106F-20E4-4638-BAF2-3768F6927375}" type="slidenum">
               <a:rPr lang="pt-BR" smtClean="0"/>
               <a:pPr/>
-              <a:t>11</a:t>
+              <a:t>10</a:t>
             </a:fld>
             <a:endParaRPr lang="pt-BR"/>
           </a:p>
@@ -4307,7 +4405,7 @@
     </p:spTree>
     <p:extLst>
       <p:ext uri="{BB962C8B-B14F-4D97-AF65-F5344CB8AC3E}">
-        <p14:creationId xmlns:p14="http://schemas.microsoft.com/office/powerpoint/2010/main" val="1592683391"/>
+        <p14:creationId xmlns:p14="http://schemas.microsoft.com/office/powerpoint/2010/main" val="1835597660"/>
       </p:ext>
     </p:extLst>
   </p:cSld>

</xml_diff>